<commit_message>
Making some changes on the presentation
</commit_message>
<xml_diff>
--- a/Add-Demo.pptx
+++ b/Add-Demo.pptx
@@ -108,6 +108,11 @@
       </a:defRPr>
     </a:lvl9pPr>
   </p:defaultTextStyle>
+  <p:extLst>
+    <p:ext uri="{EFAFB233-063F-42B5-8137-9DF3F51BA10A}">
+      <p15:sldGuideLst xmlns:p15="http://schemas.microsoft.com/office/powerpoint/2012/main"/>
+    </p:ext>
+  </p:extLst>
 </p:presentation>
 </file>
 
@@ -446,7 +451,7 @@
           <a:p>
             <a:fld id="{6743F847-A27F-4E39-B137-5EBCBE74F50B}" type="datetimeFigureOut">
               <a:rPr lang="en-US" smtClean="0"/>
-              <a:t>2/24/2021</a:t>
+              <a:t>3/5/2021</a:t>
             </a:fld>
             <a:endParaRPr lang="en-US"/>
           </a:p>
@@ -1534,7 +1539,7 @@
           <a:p>
             <a:fld id="{6743F847-A27F-4E39-B137-5EBCBE74F50B}" type="datetimeFigureOut">
               <a:rPr lang="en-US" smtClean="0"/>
-              <a:t>2/24/2021</a:t>
+              <a:t>3/5/2021</a:t>
             </a:fld>
             <a:endParaRPr lang="en-US"/>
           </a:p>
@@ -2514,7 +2519,7 @@
           <a:p>
             <a:fld id="{6743F847-A27F-4E39-B137-5EBCBE74F50B}" type="datetimeFigureOut">
               <a:rPr lang="en-US" smtClean="0"/>
-              <a:t>2/24/2021</a:t>
+              <a:t>3/5/2021</a:t>
             </a:fld>
             <a:endParaRPr lang="en-US"/>
           </a:p>
@@ -3648,7 +3653,7 @@
           <a:p>
             <a:fld id="{6743F847-A27F-4E39-B137-5EBCBE74F50B}" type="datetimeFigureOut">
               <a:rPr lang="en-US" smtClean="0"/>
-              <a:t>2/24/2021</a:t>
+              <a:t>3/5/2021</a:t>
             </a:fld>
             <a:endParaRPr lang="en-US"/>
           </a:p>
@@ -4681,7 +4686,7 @@
           <a:p>
             <a:fld id="{6743F847-A27F-4E39-B137-5EBCBE74F50B}" type="datetimeFigureOut">
               <a:rPr lang="en-US" smtClean="0"/>
-              <a:t>2/24/2021</a:t>
+              <a:t>3/5/2021</a:t>
             </a:fld>
             <a:endParaRPr lang="en-US"/>
           </a:p>
@@ -5341,7 +5346,7 @@
           <a:p>
             <a:fld id="{6743F847-A27F-4E39-B137-5EBCBE74F50B}" type="datetimeFigureOut">
               <a:rPr lang="en-US" smtClean="0"/>
-              <a:t>2/24/2021</a:t>
+              <a:t>3/5/2021</a:t>
             </a:fld>
             <a:endParaRPr lang="en-US"/>
           </a:p>
@@ -6202,7 +6207,7 @@
           <a:p>
             <a:fld id="{6743F847-A27F-4E39-B137-5EBCBE74F50B}" type="datetimeFigureOut">
               <a:rPr lang="en-US" smtClean="0"/>
-              <a:t>2/24/2021</a:t>
+              <a:t>3/5/2021</a:t>
             </a:fld>
             <a:endParaRPr lang="en-US"/>
           </a:p>
@@ -6392,7 +6397,7 @@
           <a:p>
             <a:fld id="{6743F847-A27F-4E39-B137-5EBCBE74F50B}" type="datetimeFigureOut">
               <a:rPr lang="en-US" smtClean="0"/>
-              <a:t>2/24/2021</a:t>
+              <a:t>3/5/2021</a:t>
             </a:fld>
             <a:endParaRPr lang="en-US"/>
           </a:p>
@@ -7364,7 +7369,7 @@
           <a:p>
             <a:fld id="{6743F847-A27F-4E39-B137-5EBCBE74F50B}" type="datetimeFigureOut">
               <a:rPr lang="en-US" smtClean="0"/>
-              <a:t>2/24/2021</a:t>
+              <a:t>3/5/2021</a:t>
             </a:fld>
             <a:endParaRPr lang="en-US"/>
           </a:p>
@@ -7575,7 +7580,7 @@
           <a:p>
             <a:fld id="{6743F847-A27F-4E39-B137-5EBCBE74F50B}" type="datetimeFigureOut">
               <a:rPr lang="en-US" smtClean="0"/>
-              <a:t>2/24/2021</a:t>
+              <a:t>3/5/2021</a:t>
             </a:fld>
             <a:endParaRPr lang="en-US"/>
           </a:p>
@@ -8609,7 +8614,7 @@
           <a:p>
             <a:fld id="{6743F847-A27F-4E39-B137-5EBCBE74F50B}" type="datetimeFigureOut">
               <a:rPr lang="en-US" smtClean="0"/>
-              <a:t>2/24/2021</a:t>
+              <a:t>3/5/2021</a:t>
             </a:fld>
             <a:endParaRPr lang="en-US"/>
           </a:p>
@@ -8881,7 +8886,7 @@
           <a:p>
             <a:fld id="{6743F847-A27F-4E39-B137-5EBCBE74F50B}" type="datetimeFigureOut">
               <a:rPr lang="en-US" smtClean="0"/>
-              <a:t>2/24/2021</a:t>
+              <a:t>3/5/2021</a:t>
             </a:fld>
             <a:endParaRPr lang="en-US"/>
           </a:p>
@@ -9291,7 +9296,7 @@
           <a:p>
             <a:fld id="{6743F847-A27F-4E39-B137-5EBCBE74F50B}" type="datetimeFigureOut">
               <a:rPr lang="en-US" smtClean="0"/>
-              <a:t>2/24/2021</a:t>
+              <a:t>3/5/2021</a:t>
             </a:fld>
             <a:endParaRPr lang="en-US"/>
           </a:p>
@@ -9418,7 +9423,7 @@
           <a:p>
             <a:fld id="{6743F847-A27F-4E39-B137-5EBCBE74F50B}" type="datetimeFigureOut">
               <a:rPr lang="en-US" smtClean="0"/>
-              <a:t>2/24/2021</a:t>
+              <a:t>3/5/2021</a:t>
             </a:fld>
             <a:endParaRPr lang="en-US"/>
           </a:p>
@@ -9513,7 +9518,7 @@
           <a:p>
             <a:fld id="{6743F847-A27F-4E39-B137-5EBCBE74F50B}" type="datetimeFigureOut">
               <a:rPr lang="en-US" smtClean="0"/>
-              <a:t>2/24/2021</a:t>
+              <a:t>3/5/2021</a:t>
             </a:fld>
             <a:endParaRPr lang="en-US"/>
           </a:p>
@@ -10594,7 +10599,7 @@
           <a:p>
             <a:fld id="{6743F847-A27F-4E39-B137-5EBCBE74F50B}" type="datetimeFigureOut">
               <a:rPr lang="en-US" smtClean="0"/>
-              <a:t>2/24/2021</a:t>
+              <a:t>3/5/2021</a:t>
             </a:fld>
             <a:endParaRPr lang="en-US"/>
           </a:p>
@@ -11702,7 +11707,7 @@
           <a:p>
             <a:fld id="{6743F847-A27F-4E39-B137-5EBCBE74F50B}" type="datetimeFigureOut">
               <a:rPr lang="en-US" smtClean="0"/>
-              <a:t>2/24/2021</a:t>
+              <a:t>3/5/2021</a:t>
             </a:fld>
             <a:endParaRPr lang="en-US"/>
           </a:p>
@@ -12699,7 +12704,7 @@
           <a:p>
             <a:fld id="{6743F847-A27F-4E39-B137-5EBCBE74F50B}" type="datetimeFigureOut">
               <a:rPr lang="en-US" smtClean="0"/>
-              <a:t>2/24/2021</a:t>
+              <a:t>3/5/2021</a:t>
             </a:fld>
             <a:endParaRPr lang="en-US"/>
           </a:p>
@@ -13297,8 +13302,12 @@
           <a:lstStyle/>
           <a:p>
             <a:r>
+              <a:rPr lang="en-US" smtClean="0"/>
+              <a:t>05.03.2021</a:t>
+            </a:r>
+            <a:r>
               <a:rPr lang="en-US" dirty="0" smtClean="0"/>
-              <a:t>26.02.2021.</a:t>
+              <a:t>.</a:t>
             </a:r>
             <a:endParaRPr lang="en-US" dirty="0"/>
           </a:p>
@@ -13643,8 +13652,13 @@
             <a:pPr lvl="1"/>
             <a:r>
               <a:rPr lang="en-US" dirty="0" smtClean="0"/>
-              <a:t>Java JWT</a:t>
+              <a:t>Java </a:t>
             </a:r>
+            <a:r>
+              <a:rPr lang="en-US" dirty="0" smtClean="0"/>
+              <a:t>JWT</a:t>
+            </a:r>
+            <a:endParaRPr lang="en-US" dirty="0" smtClean="0"/>
           </a:p>
           <a:p>
             <a:pPr lvl="1"/>

</xml_diff>